<commit_message>
Added Data folder and a slide on the presentation
Not much but I want to make sure these are in just in case they are needed and prevent a potential conflict
</commit_message>
<xml_diff>
--- a/PokemawnFinalPresentation.pptx
+++ b/PokemawnFinalPresentation.pptx
@@ -6,6 +6,7 @@
   </p:sldMasterIdLst>
   <p:sldIdLst>
     <p:sldId id="256" r:id="rId2"/>
+    <p:sldId id="257" r:id="rId3"/>
   </p:sldIdLst>
   <p:sldSz cx="12192000" cy="6858000"/>
   <p:notesSz cx="6858000" cy="9144000"/>
@@ -104,6 +105,11 @@
       </a:defRPr>
     </a:lvl9pPr>
   </p:defaultTextStyle>
+  <p:extLst>
+    <p:ext uri="{EFAFB233-063F-42B5-8137-9DF3F51BA10A}">
+      <p15:sldGuideLst xmlns:p15="http://schemas.microsoft.com/office/powerpoint/2012/main"/>
+    </p:ext>
+  </p:extLst>
 </p:presentation>
 </file>
 
@@ -337,7 +343,7 @@
             <a:fld id="{B61BEF0D-F0BB-DE4B-95CE-6DB70DBA9567}" type="datetimeFigureOut">
               <a:rPr lang="en-US" dirty="0"/>
               <a:pPr/>
-              <a:t>5/29/2019</a:t>
+              <a:t>6/2/2019</a:t>
             </a:fld>
             <a:endParaRPr lang="en-US" dirty="0"/>
           </a:p>
@@ -668,7 +674,7 @@
             <a:fld id="{B61BEF0D-F0BB-DE4B-95CE-6DB70DBA9567}" type="datetimeFigureOut">
               <a:rPr lang="en-US" dirty="0"/>
               <a:pPr/>
-              <a:t>5/29/2019</a:t>
+              <a:t>6/2/2019</a:t>
             </a:fld>
             <a:endParaRPr lang="en-US" dirty="0"/>
           </a:p>
@@ -943,7 +949,7 @@
             <a:fld id="{B61BEF0D-F0BB-DE4B-95CE-6DB70DBA9567}" type="datetimeFigureOut">
               <a:rPr lang="en-US" dirty="0"/>
               <a:pPr/>
-              <a:t>5/29/2019</a:t>
+              <a:t>6/2/2019</a:t>
             </a:fld>
             <a:endParaRPr lang="en-US" dirty="0"/>
           </a:p>
@@ -1508,7 +1514,7 @@
             <a:fld id="{B61BEF0D-F0BB-DE4B-95CE-6DB70DBA9567}" type="datetimeFigureOut">
               <a:rPr lang="en-US" dirty="0"/>
               <a:pPr/>
-              <a:t>5/29/2019</a:t>
+              <a:t>6/2/2019</a:t>
             </a:fld>
             <a:endParaRPr lang="en-US" dirty="0"/>
           </a:p>
@@ -1783,7 +1789,7 @@
             <a:fld id="{B61BEF0D-F0BB-DE4B-95CE-6DB70DBA9567}" type="datetimeFigureOut">
               <a:rPr lang="en-US" dirty="0"/>
               <a:pPr/>
-              <a:t>5/29/2019</a:t>
+              <a:t>6/2/2019</a:t>
             </a:fld>
             <a:endParaRPr lang="en-US" dirty="0"/>
           </a:p>
@@ -2342,7 +2348,7 @@
             <a:fld id="{B61BEF0D-F0BB-DE4B-95CE-6DB70DBA9567}" type="datetimeFigureOut">
               <a:rPr lang="en-US" dirty="0"/>
               <a:pPr/>
-              <a:t>5/29/2019</a:t>
+              <a:t>6/2/2019</a:t>
             </a:fld>
             <a:endParaRPr lang="en-US" dirty="0"/>
           </a:p>
@@ -2666,7 +2672,7 @@
             <a:fld id="{B61BEF0D-F0BB-DE4B-95CE-6DB70DBA9567}" type="datetimeFigureOut">
               <a:rPr lang="en-US" dirty="0"/>
               <a:pPr/>
-              <a:t>5/29/2019</a:t>
+              <a:t>6/2/2019</a:t>
             </a:fld>
             <a:endParaRPr lang="en-US" dirty="0"/>
           </a:p>
@@ -2868,7 +2874,7 @@
             <a:fld id="{B61BEF0D-F0BB-DE4B-95CE-6DB70DBA9567}" type="datetimeFigureOut">
               <a:rPr lang="en-US" dirty="0"/>
               <a:pPr/>
-              <a:t>5/29/2019</a:t>
+              <a:t>6/2/2019</a:t>
             </a:fld>
             <a:endParaRPr lang="en-US" dirty="0"/>
           </a:p>
@@ -3075,7 +3081,7 @@
             <a:fld id="{B61BEF0D-F0BB-DE4B-95CE-6DB70DBA9567}" type="datetimeFigureOut">
               <a:rPr lang="en-US" dirty="0"/>
               <a:pPr/>
-              <a:t>5/29/2019</a:t>
+              <a:t>6/2/2019</a:t>
             </a:fld>
             <a:endParaRPr lang="en-US" dirty="0"/>
           </a:p>
@@ -3272,7 +3278,7 @@
             <a:fld id="{B61BEF0D-F0BB-DE4B-95CE-6DB70DBA9567}" type="datetimeFigureOut">
               <a:rPr lang="en-US" dirty="0"/>
               <a:pPr/>
-              <a:t>5/29/2019</a:t>
+              <a:t>6/2/2019</a:t>
             </a:fld>
             <a:endParaRPr lang="en-US" dirty="0"/>
           </a:p>
@@ -3545,7 +3551,7 @@
             <a:fld id="{B61BEF0D-F0BB-DE4B-95CE-6DB70DBA9567}" type="datetimeFigureOut">
               <a:rPr lang="en-US" dirty="0"/>
               <a:pPr/>
-              <a:t>5/29/2019</a:t>
+              <a:t>6/2/2019</a:t>
             </a:fld>
             <a:endParaRPr lang="en-US" dirty="0"/>
           </a:p>
@@ -3808,7 +3814,7 @@
             <a:fld id="{B61BEF0D-F0BB-DE4B-95CE-6DB70DBA9567}" type="datetimeFigureOut">
               <a:rPr lang="en-US" dirty="0"/>
               <a:pPr/>
-              <a:t>5/29/2019</a:t>
+              <a:t>6/2/2019</a:t>
             </a:fld>
             <a:endParaRPr lang="en-US" dirty="0"/>
           </a:p>
@@ -4179,7 +4185,7 @@
             <a:fld id="{B61BEF0D-F0BB-DE4B-95CE-6DB70DBA9567}" type="datetimeFigureOut">
               <a:rPr lang="en-US" dirty="0"/>
               <a:pPr/>
-              <a:t>5/29/2019</a:t>
+              <a:t>6/2/2019</a:t>
             </a:fld>
             <a:endParaRPr lang="en-US" dirty="0"/>
           </a:p>
@@ -4324,7 +4330,7 @@
             <a:fld id="{B61BEF0D-F0BB-DE4B-95CE-6DB70DBA9567}" type="datetimeFigureOut">
               <a:rPr lang="en-US" dirty="0"/>
               <a:pPr/>
-              <a:t>5/29/2019</a:t>
+              <a:t>6/2/2019</a:t>
             </a:fld>
             <a:endParaRPr lang="en-US" dirty="0"/>
           </a:p>
@@ -4446,7 +4452,7 @@
             <a:fld id="{B61BEF0D-F0BB-DE4B-95CE-6DB70DBA9567}" type="datetimeFigureOut">
               <a:rPr lang="en-US" dirty="0"/>
               <a:pPr/>
-              <a:t>5/29/2019</a:t>
+              <a:t>6/2/2019</a:t>
             </a:fld>
             <a:endParaRPr lang="en-US" dirty="0"/>
           </a:p>
@@ -4728,7 +4734,7 @@
             <a:fld id="{B61BEF0D-F0BB-DE4B-95CE-6DB70DBA9567}" type="datetimeFigureOut">
               <a:rPr lang="en-US" dirty="0"/>
               <a:pPr/>
-              <a:t>5/29/2019</a:t>
+              <a:t>6/2/2019</a:t>
             </a:fld>
             <a:endParaRPr lang="en-US" dirty="0"/>
           </a:p>
@@ -5049,7 +5055,7 @@
             <a:fld id="{B61BEF0D-F0BB-DE4B-95CE-6DB70DBA9567}" type="datetimeFigureOut">
               <a:rPr lang="en-US" dirty="0"/>
               <a:pPr/>
-              <a:t>5/29/2019</a:t>
+              <a:t>6/2/2019</a:t>
             </a:fld>
             <a:endParaRPr lang="en-US" dirty="0"/>
           </a:p>
@@ -5260,7 +5266,7 @@
             <a:fld id="{B61BEF0D-F0BB-DE4B-95CE-6DB70DBA9567}" type="datetimeFigureOut">
               <a:rPr lang="en-US" dirty="0"/>
               <a:pPr/>
-              <a:t>5/29/2019</a:t>
+              <a:t>6/2/2019</a:t>
             </a:fld>
             <a:endParaRPr lang="en-US" dirty="0"/>
           </a:p>
@@ -5891,6 +5897,158 @@
 </p:sld>
 </file>
 
+<file path=ppt/slides/slide2.xml><?xml version="1.0" encoding="utf-8"?>
+<p:sld xmlns:a="http://schemas.openxmlformats.org/drawingml/2006/main" xmlns:r="http://schemas.openxmlformats.org/officeDocument/2006/relationships" xmlns:p="http://schemas.openxmlformats.org/presentationml/2006/main">
+  <p:cSld>
+    <p:spTree>
+      <p:nvGrpSpPr>
+        <p:cNvPr id="1" name=""/>
+        <p:cNvGrpSpPr/>
+        <p:nvPr/>
+      </p:nvGrpSpPr>
+      <p:grpSpPr>
+        <a:xfrm>
+          <a:off x="0" y="0"/>
+          <a:ext cx="0" cy="0"/>
+          <a:chOff x="0" y="0"/>
+          <a:chExt cx="0" cy="0"/>
+        </a:xfrm>
+      </p:grpSpPr>
+      <p:sp>
+        <p:nvSpPr>
+          <p:cNvPr id="2" name="Title 1">
+            <a:extLst>
+              <a:ext uri="{FF2B5EF4-FFF2-40B4-BE49-F238E27FC236}">
+                <a16:creationId xmlns:a16="http://schemas.microsoft.com/office/drawing/2014/main" id="{37765690-1B89-4FC7-8CE2-6A9EDF74AA38}"/>
+              </a:ext>
+            </a:extLst>
+          </p:cNvPr>
+          <p:cNvSpPr>
+            <a:spLocks noGrp="1"/>
+          </p:cNvSpPr>
+          <p:nvPr>
+            <p:ph type="title"/>
+          </p:nvPr>
+        </p:nvSpPr>
+        <p:spPr/>
+        <p:txBody>
+          <a:bodyPr>
+            <a:normAutofit/>
+          </a:bodyPr>
+          <a:lstStyle/>
+          <a:p>
+            <a:r>
+              <a:rPr lang="en-US" sz="4800" dirty="0" err="1"/>
+              <a:t>Pokemawndex</a:t>
+            </a:r>
+            <a:r>
+              <a:rPr lang="en-US" sz="4800" dirty="0"/>
+              <a:t> and battle system</a:t>
+            </a:r>
+          </a:p>
+        </p:txBody>
+      </p:sp>
+      <p:sp>
+        <p:nvSpPr>
+          <p:cNvPr id="3" name="Content Placeholder 2">
+            <a:extLst>
+              <a:ext uri="{FF2B5EF4-FFF2-40B4-BE49-F238E27FC236}">
+                <a16:creationId xmlns:a16="http://schemas.microsoft.com/office/drawing/2014/main" id="{9968808F-92BF-4602-9361-68E50DC37C29}"/>
+              </a:ext>
+            </a:extLst>
+          </p:cNvPr>
+          <p:cNvSpPr>
+            <a:spLocks noGrp="1"/>
+          </p:cNvSpPr>
+          <p:nvPr>
+            <p:ph idx="1"/>
+          </p:nvPr>
+        </p:nvSpPr>
+        <p:spPr/>
+        <p:txBody>
+          <a:bodyPr>
+            <a:normAutofit/>
+          </a:bodyPr>
+          <a:lstStyle/>
+          <a:p>
+            <a:r>
+              <a:rPr lang="en-US" sz="3200" dirty="0"/>
+              <a:t>UML class diagram</a:t>
+            </a:r>
+          </a:p>
+          <a:p>
+            <a:pPr lvl="1"/>
+            <a:r>
+              <a:rPr lang="en-US" sz="3200" dirty="0"/>
+              <a:t>Work breakdown</a:t>
+            </a:r>
+          </a:p>
+          <a:p>
+            <a:r>
+              <a:rPr lang="en-US" sz="3200" dirty="0"/>
+              <a:t>Design modifications</a:t>
+            </a:r>
+          </a:p>
+          <a:p>
+            <a:r>
+              <a:rPr lang="en-US" sz="3200" dirty="0"/>
+              <a:t>Demonstration</a:t>
+            </a:r>
+          </a:p>
+          <a:p>
+            <a:endParaRPr lang="en-US" sz="3200" dirty="0"/>
+          </a:p>
+        </p:txBody>
+      </p:sp>
+      <p:pic>
+        <p:nvPicPr>
+          <p:cNvPr id="5" name="Picture 4" descr="A close up of a logo&#10;&#10;Description automatically generated">
+            <a:extLst>
+              <a:ext uri="{FF2B5EF4-FFF2-40B4-BE49-F238E27FC236}">
+                <a16:creationId xmlns:a16="http://schemas.microsoft.com/office/drawing/2014/main" id="{5C937D79-DE01-43D4-935C-F6BAB82E9FAC}"/>
+              </a:ext>
+            </a:extLst>
+          </p:cNvPr>
+          <p:cNvPicPr>
+            <a:picLocks noChangeAspect="1"/>
+          </p:cNvPicPr>
+          <p:nvPr/>
+        </p:nvPicPr>
+        <p:blipFill>
+          <a:blip r:embed="rId2">
+            <a:extLst>
+              <a:ext uri="{837473B0-CC2E-450A-ABE3-18F120FF3D39}">
+                <a1611:picAttrSrcUrl xmlns:a1611="http://schemas.microsoft.com/office/drawing/2016/11/main" r:id="rId3"/>
+              </a:ext>
+            </a:extLst>
+          </a:blip>
+          <a:stretch>
+            <a:fillRect/>
+          </a:stretch>
+        </p:blipFill>
+        <p:spPr>
+          <a:xfrm>
+            <a:off x="6096000" y="2175661"/>
+            <a:ext cx="4525267" cy="4072739"/>
+          </a:xfrm>
+          <a:prstGeom prst="rect">
+            <a:avLst/>
+          </a:prstGeom>
+        </p:spPr>
+      </p:pic>
+    </p:spTree>
+    <p:extLst>
+      <p:ext uri="{BB962C8B-B14F-4D97-AF65-F5344CB8AC3E}">
+        <p14:creationId xmlns:p14="http://schemas.microsoft.com/office/powerpoint/2010/main" val="3335610799"/>
+      </p:ext>
+    </p:extLst>
+  </p:cSld>
+  <p:clrMapOvr>
+    <a:masterClrMapping/>
+  </p:clrMapOvr>
+</p:sld>
+</file>
+
 <file path=ppt/theme/theme1.xml><?xml version="1.0" encoding="utf-8"?>
 <a:theme xmlns:a="http://schemas.openxmlformats.org/drawingml/2006/main" name="Celestial">
   <a:themeElements>

</xml_diff>

<commit_message>
PowerPoint slide and updated diagram
</commit_message>
<xml_diff>
--- a/PokemawnFinalPresentation.pptx
+++ b/PokemawnFinalPresentation.pptx
@@ -7,6 +7,7 @@
   <p:sldIdLst>
     <p:sldId id="256" r:id="rId2"/>
     <p:sldId id="257" r:id="rId3"/>
+    <p:sldId id="258" r:id="rId4"/>
   </p:sldIdLst>
   <p:sldSz cx="12192000" cy="6858000"/>
   <p:notesSz cx="6858000" cy="9144000"/>
@@ -343,7 +344,7 @@
             <a:fld id="{B61BEF0D-F0BB-DE4B-95CE-6DB70DBA9567}" type="datetimeFigureOut">
               <a:rPr lang="en-US" dirty="0"/>
               <a:pPr/>
-              <a:t>6/2/2019</a:t>
+              <a:t>6/3/2019</a:t>
             </a:fld>
             <a:endParaRPr lang="en-US" dirty="0"/>
           </a:p>
@@ -674,7 +675,7 @@
             <a:fld id="{B61BEF0D-F0BB-DE4B-95CE-6DB70DBA9567}" type="datetimeFigureOut">
               <a:rPr lang="en-US" dirty="0"/>
               <a:pPr/>
-              <a:t>6/2/2019</a:t>
+              <a:t>6/3/2019</a:t>
             </a:fld>
             <a:endParaRPr lang="en-US" dirty="0"/>
           </a:p>
@@ -949,7 +950,7 @@
             <a:fld id="{B61BEF0D-F0BB-DE4B-95CE-6DB70DBA9567}" type="datetimeFigureOut">
               <a:rPr lang="en-US" dirty="0"/>
               <a:pPr/>
-              <a:t>6/2/2019</a:t>
+              <a:t>6/3/2019</a:t>
             </a:fld>
             <a:endParaRPr lang="en-US" dirty="0"/>
           </a:p>
@@ -1514,7 +1515,7 @@
             <a:fld id="{B61BEF0D-F0BB-DE4B-95CE-6DB70DBA9567}" type="datetimeFigureOut">
               <a:rPr lang="en-US" dirty="0"/>
               <a:pPr/>
-              <a:t>6/2/2019</a:t>
+              <a:t>6/3/2019</a:t>
             </a:fld>
             <a:endParaRPr lang="en-US" dirty="0"/>
           </a:p>
@@ -1789,7 +1790,7 @@
             <a:fld id="{B61BEF0D-F0BB-DE4B-95CE-6DB70DBA9567}" type="datetimeFigureOut">
               <a:rPr lang="en-US" dirty="0"/>
               <a:pPr/>
-              <a:t>6/2/2019</a:t>
+              <a:t>6/3/2019</a:t>
             </a:fld>
             <a:endParaRPr lang="en-US" dirty="0"/>
           </a:p>
@@ -2348,7 +2349,7 @@
             <a:fld id="{B61BEF0D-F0BB-DE4B-95CE-6DB70DBA9567}" type="datetimeFigureOut">
               <a:rPr lang="en-US" dirty="0"/>
               <a:pPr/>
-              <a:t>6/2/2019</a:t>
+              <a:t>6/3/2019</a:t>
             </a:fld>
             <a:endParaRPr lang="en-US" dirty="0"/>
           </a:p>
@@ -2672,7 +2673,7 @@
             <a:fld id="{B61BEF0D-F0BB-DE4B-95CE-6DB70DBA9567}" type="datetimeFigureOut">
               <a:rPr lang="en-US" dirty="0"/>
               <a:pPr/>
-              <a:t>6/2/2019</a:t>
+              <a:t>6/3/2019</a:t>
             </a:fld>
             <a:endParaRPr lang="en-US" dirty="0"/>
           </a:p>
@@ -2874,7 +2875,7 @@
             <a:fld id="{B61BEF0D-F0BB-DE4B-95CE-6DB70DBA9567}" type="datetimeFigureOut">
               <a:rPr lang="en-US" dirty="0"/>
               <a:pPr/>
-              <a:t>6/2/2019</a:t>
+              <a:t>6/3/2019</a:t>
             </a:fld>
             <a:endParaRPr lang="en-US" dirty="0"/>
           </a:p>
@@ -3081,7 +3082,7 @@
             <a:fld id="{B61BEF0D-F0BB-DE4B-95CE-6DB70DBA9567}" type="datetimeFigureOut">
               <a:rPr lang="en-US" dirty="0"/>
               <a:pPr/>
-              <a:t>6/2/2019</a:t>
+              <a:t>6/3/2019</a:t>
             </a:fld>
             <a:endParaRPr lang="en-US" dirty="0"/>
           </a:p>
@@ -3278,7 +3279,7 @@
             <a:fld id="{B61BEF0D-F0BB-DE4B-95CE-6DB70DBA9567}" type="datetimeFigureOut">
               <a:rPr lang="en-US" dirty="0"/>
               <a:pPr/>
-              <a:t>6/2/2019</a:t>
+              <a:t>6/3/2019</a:t>
             </a:fld>
             <a:endParaRPr lang="en-US" dirty="0"/>
           </a:p>
@@ -3551,7 +3552,7 @@
             <a:fld id="{B61BEF0D-F0BB-DE4B-95CE-6DB70DBA9567}" type="datetimeFigureOut">
               <a:rPr lang="en-US" dirty="0"/>
               <a:pPr/>
-              <a:t>6/2/2019</a:t>
+              <a:t>6/3/2019</a:t>
             </a:fld>
             <a:endParaRPr lang="en-US" dirty="0"/>
           </a:p>
@@ -3814,7 +3815,7 @@
             <a:fld id="{B61BEF0D-F0BB-DE4B-95CE-6DB70DBA9567}" type="datetimeFigureOut">
               <a:rPr lang="en-US" dirty="0"/>
               <a:pPr/>
-              <a:t>6/2/2019</a:t>
+              <a:t>6/3/2019</a:t>
             </a:fld>
             <a:endParaRPr lang="en-US" dirty="0"/>
           </a:p>
@@ -4185,7 +4186,7 @@
             <a:fld id="{B61BEF0D-F0BB-DE4B-95CE-6DB70DBA9567}" type="datetimeFigureOut">
               <a:rPr lang="en-US" dirty="0"/>
               <a:pPr/>
-              <a:t>6/2/2019</a:t>
+              <a:t>6/3/2019</a:t>
             </a:fld>
             <a:endParaRPr lang="en-US" dirty="0"/>
           </a:p>
@@ -4330,7 +4331,7 @@
             <a:fld id="{B61BEF0D-F0BB-DE4B-95CE-6DB70DBA9567}" type="datetimeFigureOut">
               <a:rPr lang="en-US" dirty="0"/>
               <a:pPr/>
-              <a:t>6/2/2019</a:t>
+              <a:t>6/3/2019</a:t>
             </a:fld>
             <a:endParaRPr lang="en-US" dirty="0"/>
           </a:p>
@@ -4452,7 +4453,7 @@
             <a:fld id="{B61BEF0D-F0BB-DE4B-95CE-6DB70DBA9567}" type="datetimeFigureOut">
               <a:rPr lang="en-US" dirty="0"/>
               <a:pPr/>
-              <a:t>6/2/2019</a:t>
+              <a:t>6/3/2019</a:t>
             </a:fld>
             <a:endParaRPr lang="en-US" dirty="0"/>
           </a:p>
@@ -4734,7 +4735,7 @@
             <a:fld id="{B61BEF0D-F0BB-DE4B-95CE-6DB70DBA9567}" type="datetimeFigureOut">
               <a:rPr lang="en-US" dirty="0"/>
               <a:pPr/>
-              <a:t>6/2/2019</a:t>
+              <a:t>6/3/2019</a:t>
             </a:fld>
             <a:endParaRPr lang="en-US" dirty="0"/>
           </a:p>
@@ -5055,7 +5056,7 @@
             <a:fld id="{B61BEF0D-F0BB-DE4B-95CE-6DB70DBA9567}" type="datetimeFigureOut">
               <a:rPr lang="en-US" dirty="0"/>
               <a:pPr/>
-              <a:t>6/2/2019</a:t>
+              <a:t>6/3/2019</a:t>
             </a:fld>
             <a:endParaRPr lang="en-US" dirty="0"/>
           </a:p>
@@ -5266,7 +5267,7 @@
             <a:fld id="{B61BEF0D-F0BB-DE4B-95CE-6DB70DBA9567}" type="datetimeFigureOut">
               <a:rPr lang="en-US" dirty="0"/>
               <a:pPr/>
-              <a:t>6/2/2019</a:t>
+              <a:t>6/3/2019</a:t>
             </a:fld>
             <a:endParaRPr lang="en-US" dirty="0"/>
           </a:p>
@@ -5791,28 +5792,42 @@
             <p:ph type="ctrTitle"/>
           </p:nvPr>
         </p:nvSpPr>
-        <p:spPr/>
-        <p:txBody>
-          <a:bodyPr/>
-          <a:lstStyle/>
-          <a:p>
-            <a:r>
-              <a:rPr lang="en-US" dirty="0" err="1"/>
+        <p:spPr>
+          <a:xfrm>
+            <a:off x="3280095" y="1964267"/>
+            <a:ext cx="7880030" cy="2421464"/>
+          </a:xfrm>
+        </p:spPr>
+        <p:txBody>
+          <a:bodyPr>
+            <a:noAutofit/>
+            <a:scene3d>
+              <a:camera prst="orthographicFront"/>
+              <a:lightRig rig="threePt" dir="t"/>
+            </a:scene3d>
+            <a:sp3d extrusionH="57150">
+              <a:bevelT w="38100" h="38100" prst="convex"/>
+            </a:sp3d>
+          </a:bodyPr>
+          <a:lstStyle/>
+          <a:p>
+            <a:r>
+              <a:rPr lang="en-US" sz="5200" b="1" dirty="0" err="1"/>
               <a:t>Pokemawn</a:t>
             </a:r>
             <a:r>
-              <a:rPr lang="en-US" dirty="0"/>
+              <a:rPr lang="en-US" sz="5200" b="1" dirty="0"/>
               <a:t>:</a:t>
             </a:r>
             <a:br>
-              <a:rPr lang="en-US" dirty="0"/>
+              <a:rPr lang="en-US" sz="5200" b="1" dirty="0"/>
             </a:br>
             <a:r>
-              <a:rPr lang="en-US" dirty="0" err="1"/>
+              <a:rPr lang="en-US" sz="5200" b="1" i="1" dirty="0" err="1"/>
               <a:t>gotta</a:t>
             </a:r>
             <a:r>
-              <a:rPr lang="en-US" dirty="0"/>
+              <a:rPr lang="en-US" sz="5200" b="1" i="1" dirty="0"/>
               <a:t> organize them all</a:t>
             </a:r>
           </a:p>
@@ -5836,54 +5851,94 @@
         </p:nvSpPr>
         <p:spPr/>
         <p:txBody>
-          <a:bodyPr/>
-          <a:lstStyle/>
-          <a:p>
-            <a:r>
-              <a:rPr lang="en-US" dirty="0"/>
+          <a:bodyPr>
+            <a:normAutofit/>
+          </a:bodyPr>
+          <a:lstStyle/>
+          <a:p>
+            <a:r>
+              <a:rPr lang="en-US" sz="2200" dirty="0"/>
               <a:t>A system by </a:t>
             </a:r>
           </a:p>
           <a:p>
             <a:r>
-              <a:rPr lang="en-US" dirty="0"/>
+              <a:rPr lang="en-US" sz="2200" dirty="0"/>
               <a:t>David </a:t>
             </a:r>
             <a:r>
-              <a:rPr lang="en-US" dirty="0" err="1"/>
+              <a:rPr lang="en-US" sz="2200" dirty="0" err="1"/>
               <a:t>chaney</a:t>
             </a:r>
             <a:r>
-              <a:rPr lang="en-US" dirty="0"/>
+              <a:rPr lang="en-US" sz="2200" dirty="0"/>
               <a:t>, </a:t>
             </a:r>
             <a:r>
-              <a:rPr lang="en-US" dirty="0" err="1"/>
+              <a:rPr lang="en-US" sz="2200" dirty="0" err="1"/>
               <a:t>steven</a:t>
             </a:r>
             <a:r>
-              <a:rPr lang="en-US" dirty="0"/>
+              <a:rPr lang="en-US" sz="2200" dirty="0"/>
               <a:t> </a:t>
             </a:r>
             <a:r>
-              <a:rPr lang="en-US" dirty="0" err="1"/>
+              <a:rPr lang="en-US" sz="2200" dirty="0" err="1"/>
               <a:t>cheney</a:t>
             </a:r>
             <a:r>
-              <a:rPr lang="en-US" dirty="0"/>
+              <a:rPr lang="en-US" sz="2200" dirty="0"/>
               <a:t>, and </a:t>
             </a:r>
             <a:r>
-              <a:rPr lang="en-US" dirty="0" err="1"/>
+              <a:rPr lang="en-US" sz="2200" dirty="0" err="1"/>
               <a:t>james</a:t>
             </a:r>
             <a:r>
-              <a:rPr lang="en-US" dirty="0"/>
+              <a:rPr lang="en-US" sz="2200" dirty="0"/>
               <a:t> spencer</a:t>
             </a:r>
           </a:p>
         </p:txBody>
       </p:sp>
+      <p:pic>
+        <p:nvPicPr>
+          <p:cNvPr id="4" name="PokemonTheme">
+            <a:hlinkClick r:id="" action="ppaction://media"/>
+            <a:extLst>
+              <a:ext uri="{FF2B5EF4-FFF2-40B4-BE49-F238E27FC236}">
+                <a16:creationId xmlns:a16="http://schemas.microsoft.com/office/drawing/2014/main" id="{403FED8F-9928-46DF-8F40-38FBDBBA3E0B}"/>
+              </a:ext>
+            </a:extLst>
+          </p:cNvPr>
+          <p:cNvPicPr>
+            <a:picLocks noChangeAspect="1"/>
+          </p:cNvPicPr>
+          <p:nvPr>
+            <a:audioFile r:link="rId2"/>
+            <p:extLst>
+              <p:ext uri="{DAA4B4D4-6D71-4841-9C94-3DE7FCFB9230}">
+                <p14:media xmlns:p14="http://schemas.microsoft.com/office/powerpoint/2010/main" r:embed="rId1"/>
+              </p:ext>
+            </p:extLst>
+          </p:nvPr>
+        </p:nvPicPr>
+        <p:blipFill>
+          <a:blip r:embed="rId4"/>
+          <a:stretch>
+            <a:fillRect/>
+          </a:stretch>
+        </p:blipFill>
+        <p:spPr>
+          <a:xfrm>
+            <a:off x="12101468" y="7109360"/>
+            <a:ext cx="181063" cy="181063"/>
+          </a:xfrm>
+          <a:prstGeom prst="rect">
+            <a:avLst/>
+          </a:prstGeom>
+        </p:spPr>
+      </p:pic>
     </p:spTree>
     <p:extLst>
       <p:ext uri="{BB962C8B-B14F-4D97-AF65-F5344CB8AC3E}">
@@ -5894,6 +5949,93 @@
   <p:clrMapOvr>
     <a:masterClrMapping/>
   </p:clrMapOvr>
+  <p:timing>
+    <p:tnLst>
+      <p:par>
+        <p:cTn id="1" dur="indefinite" restart="never" nodeType="tmRoot">
+          <p:childTnLst>
+            <p:seq concurrent="1" nextAc="seek">
+              <p:cTn id="2" dur="indefinite" nodeType="mainSeq">
+                <p:childTnLst>
+                  <p:par>
+                    <p:cTn id="3" fill="hold">
+                      <p:stCondLst>
+                        <p:cond delay="indefinite"/>
+                        <p:cond evt="onBegin" delay="0">
+                          <p:tn val="2"/>
+                        </p:cond>
+                      </p:stCondLst>
+                      <p:childTnLst>
+                        <p:par>
+                          <p:cTn id="4" fill="hold">
+                            <p:stCondLst>
+                              <p:cond delay="0"/>
+                            </p:stCondLst>
+                            <p:childTnLst>
+                              <p:par>
+                                <p:cTn id="5" presetID="1" presetClass="mediacall" presetSubtype="0" fill="hold" nodeType="afterEffect">
+                                  <p:stCondLst>
+                                    <p:cond delay="0"/>
+                                  </p:stCondLst>
+                                  <p:childTnLst>
+                                    <p:cmd type="call" cmd="playFrom(0.0)">
+                                      <p:cBhvr>
+                                        <p:cTn id="6" dur="60029" fill="hold"/>
+                                        <p:tgtEl>
+                                          <p:spTgt spid="4"/>
+                                        </p:tgtEl>
+                                      </p:cBhvr>
+                                    </p:cmd>
+                                  </p:childTnLst>
+                                </p:cTn>
+                              </p:par>
+                            </p:childTnLst>
+                          </p:cTn>
+                        </p:par>
+                      </p:childTnLst>
+                    </p:cTn>
+                  </p:par>
+                </p:childTnLst>
+              </p:cTn>
+              <p:prevCondLst>
+                <p:cond evt="onPrev" delay="0">
+                  <p:tgtEl>
+                    <p:sldTgt/>
+                  </p:tgtEl>
+                </p:cond>
+              </p:prevCondLst>
+              <p:nextCondLst>
+                <p:cond evt="onNext" delay="0">
+                  <p:tgtEl>
+                    <p:sldTgt/>
+                  </p:tgtEl>
+                </p:cond>
+              </p:nextCondLst>
+            </p:seq>
+            <p:audio>
+              <p:cMediaNode vol="80000">
+                <p:cTn id="7" fill="hold" display="0">
+                  <p:stCondLst>
+                    <p:cond delay="indefinite"/>
+                  </p:stCondLst>
+                  <p:endCondLst>
+                    <p:cond evt="onStopAudio" delay="0">
+                      <p:tgtEl>
+                        <p:sldTgt/>
+                      </p:tgtEl>
+                    </p:cond>
+                  </p:endCondLst>
+                </p:cTn>
+                <p:tgtEl>
+                  <p:spTgt spid="4"/>
+                </p:tgtEl>
+              </p:cMediaNode>
+            </p:audio>
+          </p:childTnLst>
+        </p:cTn>
+      </p:par>
+    </p:tnLst>
+  </p:timing>
 </p:sld>
 </file>
 
@@ -5964,7 +6106,12 @@
             <p:ph idx="1"/>
           </p:nvPr>
         </p:nvSpPr>
-        <p:spPr/>
+        <p:spPr>
+          <a:xfrm>
+            <a:off x="1040235" y="2142067"/>
+            <a:ext cx="9776991" cy="3649133"/>
+          </a:xfrm>
+        </p:spPr>
         <p:txBody>
           <a:bodyPr>
             <a:normAutofit/>
@@ -5987,6 +6134,12 @@
             <a:r>
               <a:rPr lang="en-US" sz="3200" dirty="0"/>
               <a:t>Design modifications</a:t>
+            </a:r>
+          </a:p>
+          <a:p>
+            <a:r>
+              <a:rPr lang="en-US" sz="3200" dirty="0"/>
+              <a:t>Class and flow details</a:t>
             </a:r>
           </a:p>
           <a:p>
@@ -6029,7 +6182,7 @@
         <p:spPr>
           <a:xfrm>
             <a:off x="6096000" y="2175661"/>
-            <a:ext cx="4525267" cy="4072739"/>
+            <a:ext cx="4843244" cy="4358918"/>
           </a:xfrm>
           <a:prstGeom prst="rect">
             <a:avLst/>
@@ -6040,6 +6193,189 @@
     <p:extLst>
       <p:ext uri="{BB962C8B-B14F-4D97-AF65-F5344CB8AC3E}">
         <p14:creationId xmlns:p14="http://schemas.microsoft.com/office/powerpoint/2010/main" val="3335610799"/>
+      </p:ext>
+    </p:extLst>
+  </p:cSld>
+  <p:clrMapOvr>
+    <a:masterClrMapping/>
+  </p:clrMapOvr>
+</p:sld>
+</file>
+
+<file path=ppt/slides/slide3.xml><?xml version="1.0" encoding="utf-8"?>
+<p:sld xmlns:a="http://schemas.openxmlformats.org/drawingml/2006/main" xmlns:r="http://schemas.openxmlformats.org/officeDocument/2006/relationships" xmlns:p="http://schemas.openxmlformats.org/presentationml/2006/main">
+  <p:cSld>
+    <p:spTree>
+      <p:nvGrpSpPr>
+        <p:cNvPr id="1" name=""/>
+        <p:cNvGrpSpPr/>
+        <p:nvPr/>
+      </p:nvGrpSpPr>
+      <p:grpSpPr>
+        <a:xfrm>
+          <a:off x="0" y="0"/>
+          <a:ext cx="0" cy="0"/>
+          <a:chOff x="0" y="0"/>
+          <a:chExt cx="0" cy="0"/>
+        </a:xfrm>
+      </p:grpSpPr>
+      <p:sp>
+        <p:nvSpPr>
+          <p:cNvPr id="2" name="Title 1">
+            <a:extLst>
+              <a:ext uri="{FF2B5EF4-FFF2-40B4-BE49-F238E27FC236}">
+                <a16:creationId xmlns:a16="http://schemas.microsoft.com/office/drawing/2014/main" id="{878A7F65-EAA2-4F26-BC24-71FC7D422153}"/>
+              </a:ext>
+            </a:extLst>
+          </p:cNvPr>
+          <p:cNvSpPr>
+            <a:spLocks noGrp="1"/>
+          </p:cNvSpPr>
+          <p:nvPr>
+            <p:ph type="title"/>
+          </p:nvPr>
+        </p:nvSpPr>
+        <p:spPr>
+          <a:xfrm>
+            <a:off x="685799" y="4844258"/>
+            <a:ext cx="10131427" cy="566738"/>
+          </a:xfrm>
+        </p:spPr>
+        <p:txBody>
+          <a:bodyPr>
+            <a:normAutofit/>
+          </a:bodyPr>
+          <a:lstStyle/>
+          <a:p>
+            <a:r>
+              <a:rPr lang="en-US" sz="2600" dirty="0" err="1"/>
+              <a:t>Uml</a:t>
+            </a:r>
+            <a:r>
+              <a:rPr lang="en-US" sz="2600" dirty="0"/>
+              <a:t> Class Diagram</a:t>
+            </a:r>
+          </a:p>
+        </p:txBody>
+      </p:sp>
+      <p:pic>
+        <p:nvPicPr>
+          <p:cNvPr id="6" name="Picture Placeholder 5" descr="A screenshot of a cell phone&#10;&#10;Description automatically generated">
+            <a:extLst>
+              <a:ext uri="{FF2B5EF4-FFF2-40B4-BE49-F238E27FC236}">
+                <a16:creationId xmlns:a16="http://schemas.microsoft.com/office/drawing/2014/main" id="{CF3FE4B4-8649-425B-8E4A-728436D404D0}"/>
+              </a:ext>
+            </a:extLst>
+          </p:cNvPr>
+          <p:cNvPicPr>
+            <a:picLocks noGrp="1" noChangeAspect="1"/>
+          </p:cNvPicPr>
+          <p:nvPr>
+            <p:ph type="pic" idx="1"/>
+          </p:nvPr>
+        </p:nvPicPr>
+        <p:blipFill>
+          <a:blip r:embed="rId2"/>
+          <a:srcRect t="6948" b="6948"/>
+          <a:stretch>
+            <a:fillRect/>
+          </a:stretch>
+        </p:blipFill>
+        <p:spPr>
+          <a:xfrm>
+            <a:off x="0" y="230703"/>
+            <a:ext cx="12192143" cy="4405092"/>
+          </a:xfrm>
+          <a:effectLst>
+            <a:reflection stA="10000" endPos="10000" dir="5400000" sy="-100000" algn="bl" rotWithShape="0"/>
+          </a:effectLst>
+        </p:spPr>
+      </p:pic>
+      <p:sp>
+        <p:nvSpPr>
+          <p:cNvPr id="4" name="Text Placeholder 3">
+            <a:extLst>
+              <a:ext uri="{FF2B5EF4-FFF2-40B4-BE49-F238E27FC236}">
+                <a16:creationId xmlns:a16="http://schemas.microsoft.com/office/drawing/2014/main" id="{E8BB5309-2402-41D8-8673-D320B101D4D0}"/>
+              </a:ext>
+            </a:extLst>
+          </p:cNvPr>
+          <p:cNvSpPr>
+            <a:spLocks noGrp="1"/>
+          </p:cNvSpPr>
+          <p:nvPr>
+            <p:ph type="body" sz="half" idx="2"/>
+          </p:nvPr>
+        </p:nvSpPr>
+        <p:spPr>
+          <a:xfrm>
+            <a:off x="418214" y="5410996"/>
+            <a:ext cx="11355571" cy="963070"/>
+          </a:xfrm>
+        </p:spPr>
+        <p:txBody>
+          <a:bodyPr numCol="2">
+            <a:noAutofit/>
+          </a:bodyPr>
+          <a:lstStyle/>
+          <a:p>
+            <a:pPr marL="285750" indent="-285750">
+              <a:buFont typeface="Arial" panose="020B0604020202020204" pitchFamily="34" charset="0"/>
+              <a:buChar char="•"/>
+            </a:pPr>
+            <a:r>
+              <a:rPr lang="en-US" sz="2000" dirty="0"/>
+              <a:t>Fundamentals of system remain</a:t>
+            </a:r>
+          </a:p>
+          <a:p>
+            <a:pPr marL="285750" indent="-285750">
+              <a:buFont typeface="Arial" panose="020B0604020202020204" pitchFamily="34" charset="0"/>
+              <a:buChar char="•"/>
+            </a:pPr>
+            <a:r>
+              <a:rPr lang="en-US" sz="2000" dirty="0"/>
+              <a:t>Primary additions are the controllers</a:t>
+            </a:r>
+          </a:p>
+          <a:p>
+            <a:endParaRPr lang="en-US" sz="2000" dirty="0"/>
+          </a:p>
+          <a:p>
+            <a:pPr marL="285750" indent="-285750">
+              <a:buFont typeface="Arial" panose="020B0604020202020204" pitchFamily="34" charset="0"/>
+              <a:buChar char="•"/>
+            </a:pPr>
+            <a:r>
+              <a:rPr lang="en-US" sz="2000" dirty="0" err="1"/>
+              <a:t>DataController</a:t>
+            </a:r>
+            <a:r>
+              <a:rPr lang="en-US" sz="2000" dirty="0"/>
+              <a:t> handles loading the </a:t>
+            </a:r>
+            <a:r>
+              <a:rPr lang="en-US" sz="2000" dirty="0" err="1"/>
+              <a:t>Dex</a:t>
+            </a:r>
+            <a:r>
+              <a:rPr lang="en-US" sz="2000" dirty="0"/>
+              <a:t> to the program</a:t>
+            </a:r>
+          </a:p>
+          <a:p>
+            <a:pPr marL="285750" indent="-285750">
+              <a:buFont typeface="Arial" panose="020B0604020202020204" pitchFamily="34" charset="0"/>
+              <a:buChar char="•"/>
+            </a:pPr>
+            <a:endParaRPr lang="en-US" sz="2000" dirty="0"/>
+          </a:p>
+        </p:txBody>
+      </p:sp>
+    </p:spTree>
+    <p:extLst>
+      <p:ext uri="{BB962C8B-B14F-4D97-AF65-F5344CB8AC3E}">
+        <p14:creationId xmlns:p14="http://schemas.microsoft.com/office/powerpoint/2010/main" val="3312563152"/>
       </p:ext>
     </p:extLst>
   </p:cSld>

</xml_diff>

<commit_message>
Presentation Controller slide addendum
</commit_message>
<xml_diff>
--- a/PokemawnFinalPresentation.pptx
+++ b/PokemawnFinalPresentation.pptx
@@ -13,10 +13,11 @@
     <p:sldId id="260" r:id="rId7"/>
     <p:sldId id="261" r:id="rId8"/>
     <p:sldId id="268" r:id="rId9"/>
-    <p:sldId id="263" r:id="rId10"/>
-    <p:sldId id="264" r:id="rId11"/>
-    <p:sldId id="265" r:id="rId12"/>
-    <p:sldId id="266" r:id="rId13"/>
+    <p:sldId id="269" r:id="rId10"/>
+    <p:sldId id="263" r:id="rId11"/>
+    <p:sldId id="264" r:id="rId12"/>
+    <p:sldId id="265" r:id="rId13"/>
+    <p:sldId id="266" r:id="rId14"/>
   </p:sldIdLst>
   <p:sldSz cx="12192000" cy="6858000"/>
   <p:notesSz cx="6858000" cy="9144000"/>
@@ -6051,6 +6052,182 @@
 <file path=ppt/slides/slide10.xml><?xml version="1.0" encoding="utf-8"?>
 <p:sld xmlns:a="http://schemas.openxmlformats.org/drawingml/2006/main" xmlns:r="http://schemas.openxmlformats.org/officeDocument/2006/relationships" xmlns:p="http://schemas.openxmlformats.org/presentationml/2006/main">
   <p:cSld>
+    <p:spTree>
+      <p:nvGrpSpPr>
+        <p:cNvPr id="1" name=""/>
+        <p:cNvGrpSpPr/>
+        <p:nvPr/>
+      </p:nvGrpSpPr>
+      <p:grpSpPr>
+        <a:xfrm>
+          <a:off x="0" y="0"/>
+          <a:ext cx="0" cy="0"/>
+          <a:chOff x="0" y="0"/>
+          <a:chExt cx="0" cy="0"/>
+        </a:xfrm>
+      </p:grpSpPr>
+      <p:sp>
+        <p:nvSpPr>
+          <p:cNvPr id="2" name="Title 1">
+            <a:extLst>
+              <a:ext uri="{FF2B5EF4-FFF2-40B4-BE49-F238E27FC236}">
+                <a16:creationId xmlns:a16="http://schemas.microsoft.com/office/drawing/2014/main" id="{23CFD05B-B58D-4C93-85F6-AB1499DFC0CC}"/>
+              </a:ext>
+            </a:extLst>
+          </p:cNvPr>
+          <p:cNvSpPr>
+            <a:spLocks noGrp="1"/>
+          </p:cNvSpPr>
+          <p:nvPr>
+            <p:ph type="title"/>
+          </p:nvPr>
+        </p:nvSpPr>
+        <p:spPr>
+          <a:xfrm>
+            <a:off x="5179931" y="1665516"/>
+            <a:ext cx="6164653" cy="1371600"/>
+          </a:xfrm>
+        </p:spPr>
+        <p:txBody>
+          <a:bodyPr>
+            <a:normAutofit/>
+          </a:bodyPr>
+          <a:lstStyle/>
+          <a:p>
+            <a:r>
+              <a:rPr lang="en-US" sz="4200" dirty="0" err="1"/>
+              <a:t>buttonmanager</a:t>
+            </a:r>
+            <a:endParaRPr lang="en-US" sz="4200" dirty="0"/>
+          </a:p>
+        </p:txBody>
+      </p:sp>
+      <p:pic>
+        <p:nvPicPr>
+          <p:cNvPr id="6" name="Picture Placeholder 5" descr="A picture containing screenshot&#10;&#10;Description automatically generated">
+            <a:extLst>
+              <a:ext uri="{FF2B5EF4-FFF2-40B4-BE49-F238E27FC236}">
+                <a16:creationId xmlns:a16="http://schemas.microsoft.com/office/drawing/2014/main" id="{C211A270-A3C2-490D-B75D-176EEC9DACF1}"/>
+              </a:ext>
+            </a:extLst>
+          </p:cNvPr>
+          <p:cNvPicPr>
+            <a:picLocks noGrp="1" noChangeAspect="1"/>
+          </p:cNvPicPr>
+          <p:nvPr>
+            <p:ph type="pic" idx="1"/>
+          </p:nvPr>
+        </p:nvPicPr>
+        <p:blipFill>
+          <a:blip r:embed="rId2"/>
+          <a:srcRect l="10158" r="10158"/>
+          <a:stretch>
+            <a:fillRect/>
+          </a:stretch>
+        </p:blipFill>
+        <p:spPr>
+          <a:xfrm>
+            <a:off x="1013182" y="1143000"/>
+            <a:ext cx="3279775" cy="4572000"/>
+          </a:xfrm>
+        </p:spPr>
+      </p:pic>
+      <p:sp>
+        <p:nvSpPr>
+          <p:cNvPr id="4" name="Text Placeholder 3">
+            <a:extLst>
+              <a:ext uri="{FF2B5EF4-FFF2-40B4-BE49-F238E27FC236}">
+                <a16:creationId xmlns:a16="http://schemas.microsoft.com/office/drawing/2014/main" id="{ECB9FC8E-E131-4B4B-BC29-51DAB85B6226}"/>
+              </a:ext>
+            </a:extLst>
+          </p:cNvPr>
+          <p:cNvSpPr>
+            <a:spLocks noGrp="1"/>
+          </p:cNvSpPr>
+          <p:nvPr>
+            <p:ph type="body" sz="half" idx="2"/>
+          </p:nvPr>
+        </p:nvSpPr>
+        <p:spPr>
+          <a:xfrm>
+            <a:off x="5179931" y="3321696"/>
+            <a:ext cx="6164653" cy="1828800"/>
+          </a:xfrm>
+        </p:spPr>
+        <p:txBody>
+          <a:bodyPr>
+            <a:normAutofit/>
+          </a:bodyPr>
+          <a:lstStyle/>
+          <a:p>
+            <a:pPr marL="285750" indent="-285750">
+              <a:buFont typeface="Arial" panose="020B0604020202020204" pitchFamily="34" charset="0"/>
+              <a:buChar char="•"/>
+            </a:pPr>
+            <a:r>
+              <a:rPr lang="en-US" sz="2200" dirty="0"/>
+              <a:t>Controls </a:t>
+            </a:r>
+            <a:r>
+              <a:rPr lang="en-US" sz="2200" dirty="0" err="1"/>
+              <a:t>Pokemawndex</a:t>
+            </a:r>
+            <a:r>
+              <a:rPr lang="en-US" sz="2200" dirty="0"/>
+              <a:t> UI</a:t>
+            </a:r>
+          </a:p>
+          <a:p>
+            <a:pPr marL="285750" indent="-285750">
+              <a:buFont typeface="Arial" panose="020B0604020202020204" pitchFamily="34" charset="0"/>
+              <a:buChar char="•"/>
+            </a:pPr>
+            <a:r>
+              <a:rPr lang="en-US" sz="2200" dirty="0"/>
+              <a:t>Facilitates the </a:t>
+            </a:r>
+            <a:r>
+              <a:rPr lang="en-US" sz="2200" dirty="0" err="1"/>
+              <a:t>DataController</a:t>
+            </a:r>
+            <a:r>
+              <a:rPr lang="en-US" sz="2200" dirty="0"/>
+              <a:t> to create, save, and load new </a:t>
+            </a:r>
+            <a:r>
+              <a:rPr lang="en-US" sz="2200" dirty="0" err="1"/>
+              <a:t>Pokemawn</a:t>
+            </a:r>
+            <a:endParaRPr lang="en-US" sz="2200" dirty="0"/>
+          </a:p>
+          <a:p>
+            <a:pPr marL="285750" indent="-285750">
+              <a:buFont typeface="Arial" panose="020B0604020202020204" pitchFamily="34" charset="0"/>
+              <a:buChar char="•"/>
+            </a:pPr>
+            <a:r>
+              <a:rPr lang="en-US" sz="2200" dirty="0"/>
+              <a:t>Stores the created creatures in an index UI</a:t>
+            </a:r>
+          </a:p>
+        </p:txBody>
+      </p:sp>
+    </p:spTree>
+    <p:extLst>
+      <p:ext uri="{BB962C8B-B14F-4D97-AF65-F5344CB8AC3E}">
+        <p14:creationId xmlns:p14="http://schemas.microsoft.com/office/powerpoint/2010/main" val="364295835"/>
+      </p:ext>
+    </p:extLst>
+  </p:cSld>
+  <p:clrMapOvr>
+    <a:masterClrMapping/>
+  </p:clrMapOvr>
+</p:sld>
+</file>
+
+<file path=ppt/slides/slide11.xml><?xml version="1.0" encoding="utf-8"?>
+<p:sld xmlns:a="http://schemas.openxmlformats.org/drawingml/2006/main" xmlns:r="http://schemas.openxmlformats.org/officeDocument/2006/relationships" xmlns:p="http://schemas.openxmlformats.org/presentationml/2006/main">
+  <p:cSld>
     <p:bg>
       <p:bgPr>
         <a:blipFill>
@@ -6285,7 +6462,7 @@
 </p:sld>
 </file>
 
-<file path=ppt/slides/slide11.xml><?xml version="1.0" encoding="utf-8"?>
+<file path=ppt/slides/slide12.xml><?xml version="1.0" encoding="utf-8"?>
 <p:sld xmlns:a="http://schemas.openxmlformats.org/drawingml/2006/main" xmlns:r="http://schemas.openxmlformats.org/officeDocument/2006/relationships" xmlns:p="http://schemas.openxmlformats.org/presentationml/2006/main">
   <p:cSld>
     <p:bg>
@@ -6561,7 +6738,7 @@
 </p:sld>
 </file>
 
-<file path=ppt/slides/slide12.xml><?xml version="1.0" encoding="utf-8"?>
+<file path=ppt/slides/slide13.xml><?xml version="1.0" encoding="utf-8"?>
 <p:sld xmlns:a="http://schemas.openxmlformats.org/drawingml/2006/main" xmlns:r="http://schemas.openxmlformats.org/officeDocument/2006/relationships" xmlns:p="http://schemas.openxmlformats.org/presentationml/2006/main">
   <p:cSld>
     <p:bg>
@@ -8826,7 +9003,7 @@
         </p:blipFill>
         <p:spPr>
           <a:xfrm>
-            <a:off x="1222374" y="1548881"/>
+            <a:off x="1174103" y="1631790"/>
             <a:ext cx="3269084" cy="5039598"/>
           </a:xfrm>
         </p:spPr>
@@ -8855,7 +9032,7 @@
         </p:blipFill>
         <p:spPr>
           <a:xfrm>
-            <a:off x="5191943" y="1549719"/>
+            <a:off x="5452188" y="1632628"/>
             <a:ext cx="6161856" cy="5038760"/>
           </a:xfrm>
         </p:spPr>
@@ -9031,7 +9208,7 @@
           <p:cNvPr id="2" name="Title 1">
             <a:extLst>
               <a:ext uri="{FF2B5EF4-FFF2-40B4-BE49-F238E27FC236}">
-                <a16:creationId xmlns:a16="http://schemas.microsoft.com/office/drawing/2014/main" id="{23CFD05B-B58D-4C93-85F6-AB1499DFC0CC}"/>
+                <a16:creationId xmlns:a16="http://schemas.microsoft.com/office/drawing/2014/main" id="{F60A1E79-C3A4-4501-869A-ACFA849555E3}"/>
               </a:ext>
             </a:extLst>
           </p:cNvPr>
@@ -9044,8 +9221,8 @@
         </p:nvSpPr>
         <p:spPr>
           <a:xfrm>
-            <a:off x="5179931" y="1665516"/>
-            <a:ext cx="6164653" cy="1371600"/>
+            <a:off x="583163" y="618757"/>
+            <a:ext cx="3680885" cy="1828800"/>
           </a:xfrm>
         </p:spPr>
         <p:txBody>
@@ -9055,19 +9232,18 @@
           <a:lstStyle/>
           <a:p>
             <a:r>
-              <a:rPr lang="en-US" sz="4200" dirty="0" err="1"/>
-              <a:t>buttonmanager</a:t>
-            </a:r>
-            <a:endParaRPr lang="en-US" sz="4200" dirty="0"/>
+              <a:rPr lang="en-US" sz="4200" dirty="0"/>
+              <a:t>Creature controller</a:t>
+            </a:r>
           </a:p>
         </p:txBody>
       </p:sp>
       <p:pic>
         <p:nvPicPr>
-          <p:cNvPr id="6" name="Picture Placeholder 5" descr="A picture containing screenshot&#10;&#10;Description automatically generated">
+          <p:cNvPr id="6" name="Content Placeholder 5" descr="A screenshot of a cell phone&#10;&#10;Description automatically generated">
             <a:extLst>
               <a:ext uri="{FF2B5EF4-FFF2-40B4-BE49-F238E27FC236}">
-                <a16:creationId xmlns:a16="http://schemas.microsoft.com/office/drawing/2014/main" id="{C211A270-A3C2-490D-B75D-176EEC9DACF1}"/>
+                <a16:creationId xmlns:a16="http://schemas.microsoft.com/office/drawing/2014/main" id="{E21EDEBF-F584-4BD3-B2B0-0063E8257B82}"/>
               </a:ext>
             </a:extLst>
           </p:cNvPr>
@@ -9075,20 +9251,19 @@
             <a:picLocks noGrp="1" noChangeAspect="1"/>
           </p:cNvPicPr>
           <p:nvPr>
-            <p:ph type="pic" idx="1"/>
+            <p:ph idx="1"/>
           </p:nvPr>
         </p:nvPicPr>
         <p:blipFill>
           <a:blip r:embed="rId2"/>
-          <a:srcRect l="10158" r="10158"/>
           <a:stretch>
             <a:fillRect/>
           </a:stretch>
         </p:blipFill>
         <p:spPr>
           <a:xfrm>
-            <a:off x="1013182" y="1143000"/>
-            <a:ext cx="3279775" cy="4572000"/>
+            <a:off x="4581233" y="0"/>
+            <a:ext cx="7591228" cy="6718041"/>
           </a:xfrm>
         </p:spPr>
       </p:pic>
@@ -9097,7 +9272,7 @@
           <p:cNvPr id="4" name="Text Placeholder 3">
             <a:extLst>
               <a:ext uri="{FF2B5EF4-FFF2-40B4-BE49-F238E27FC236}">
-                <a16:creationId xmlns:a16="http://schemas.microsoft.com/office/drawing/2014/main" id="{ECB9FC8E-E131-4B4B-BC29-51DAB85B6226}"/>
+                <a16:creationId xmlns:a16="http://schemas.microsoft.com/office/drawing/2014/main" id="{8B8271B3-6DFB-47CD-B02F-FE3868EAEEBA}"/>
               </a:ext>
             </a:extLst>
           </p:cNvPr>
@@ -9110,64 +9285,63 @@
         </p:nvSpPr>
         <p:spPr>
           <a:xfrm>
-            <a:off x="5179931" y="3321696"/>
-            <a:ext cx="6164653" cy="1828800"/>
+            <a:off x="583162" y="2849034"/>
+            <a:ext cx="3680885" cy="3122819"/>
           </a:xfrm>
         </p:spPr>
         <p:txBody>
           <a:bodyPr>
-            <a:normAutofit/>
+            <a:normAutofit fontScale="85000" lnSpcReduction="20000"/>
           </a:bodyPr>
           <a:lstStyle/>
           <a:p>
-            <a:pPr marL="285750" indent="-285750">
+            <a:pPr marL="342900" indent="-342900">
               <a:buFont typeface="Arial" panose="020B0604020202020204" pitchFamily="34" charset="0"/>
               <a:buChar char="•"/>
             </a:pPr>
             <a:r>
-              <a:rPr lang="en-US" sz="2200" dirty="0"/>
-              <a:t>Controls </a:t>
-            </a:r>
-            <a:r>
-              <a:rPr lang="en-US" sz="2200" dirty="0" err="1"/>
-              <a:t>Pokemawndex</a:t>
-            </a:r>
-            <a:r>
-              <a:rPr lang="en-US" sz="2200" dirty="0"/>
-              <a:t> UI</a:t>
-            </a:r>
-          </a:p>
-          <a:p>
-            <a:pPr marL="285750" indent="-285750">
+              <a:rPr lang="en-US" sz="2400" dirty="0"/>
+              <a:t>Abstract class that all controllers derive from</a:t>
+            </a:r>
+          </a:p>
+          <a:p>
+            <a:pPr marL="800100" lvl="1" indent="-342900">
               <a:buFont typeface="Arial" panose="020B0604020202020204" pitchFamily="34" charset="0"/>
               <a:buChar char="•"/>
             </a:pPr>
             <a:r>
-              <a:rPr lang="en-US" sz="2200" dirty="0"/>
-              <a:t>Facilitates the </a:t>
-            </a:r>
-            <a:r>
-              <a:rPr lang="en-US" sz="2200" dirty="0" err="1"/>
-              <a:t>DataController</a:t>
-            </a:r>
-            <a:r>
-              <a:rPr lang="en-US" sz="2200" dirty="0"/>
-              <a:t> to create, save, and load new </a:t>
-            </a:r>
-            <a:r>
-              <a:rPr lang="en-US" sz="2200" dirty="0" err="1"/>
-              <a:t>Pokemawn</a:t>
-            </a:r>
-            <a:endParaRPr lang="en-US" sz="2200" dirty="0"/>
-          </a:p>
-          <a:p>
-            <a:pPr marL="285750" indent="-285750">
+              <a:rPr lang="en-US" sz="2000" dirty="0"/>
+              <a:t>Cannot be instantiated</a:t>
+            </a:r>
+          </a:p>
+          <a:p>
+            <a:pPr marL="800100" lvl="1" indent="-342900">
               <a:buFont typeface="Arial" panose="020B0604020202020204" pitchFamily="34" charset="0"/>
               <a:buChar char="•"/>
             </a:pPr>
             <a:r>
-              <a:rPr lang="en-US" sz="2200" dirty="0"/>
-              <a:t>Stores the created creatures in an index UI</a:t>
+              <a:rPr lang="en-US" sz="2000" dirty="0"/>
+              <a:t>Sets up the basic framework for which all children have commonalities</a:t>
+            </a:r>
+          </a:p>
+          <a:p>
+            <a:pPr marL="342900" indent="-342900">
+              <a:buFont typeface="Arial" panose="020B0604020202020204" pitchFamily="34" charset="0"/>
+              <a:buChar char="•"/>
+            </a:pPr>
+            <a:r>
+              <a:rPr lang="en-US" sz="2400" dirty="0"/>
+              <a:t>Vehicle example</a:t>
+            </a:r>
+          </a:p>
+          <a:p>
+            <a:pPr marL="800100" lvl="1" indent="-342900">
+              <a:buFont typeface="Arial" panose="020B0604020202020204" pitchFamily="34" charset="0"/>
+              <a:buChar char="•"/>
+            </a:pPr>
+            <a:r>
+              <a:rPr lang="en-US" sz="2000" dirty="0"/>
+              <a:t>We can create a car and we can create a bus. These are types of vehicles but we cannot create a “vehicle”.</a:t>
             </a:r>
           </a:p>
         </p:txBody>
@@ -9175,7 +9349,7 @@
     </p:spTree>
     <p:extLst>
       <p:ext uri="{BB962C8B-B14F-4D97-AF65-F5344CB8AC3E}">
-        <p14:creationId xmlns:p14="http://schemas.microsoft.com/office/powerpoint/2010/main" val="364295835"/>
+        <p14:creationId xmlns:p14="http://schemas.microsoft.com/office/powerpoint/2010/main" val="614710638"/>
       </p:ext>
     </p:extLst>
   </p:cSld>

</xml_diff>